<commit_message>
add new definition format
Slides and 3 example files
</commit_message>
<xml_diff>
--- a/ODM-CDF.pptx
+++ b/ODM-CDF.pptx
@@ -232,7 +232,7 @@
           <a:p>
             <a:fld id="{CAA8BD54-1B67-094F-844E-AC8F37AF9E32}" type="datetimeFigureOut">
               <a:rPr lang="en-US" smtClean="0"/>
-              <a:t>3/26/19</a:t>
+              <a:t>4/3/19</a:t>
             </a:fld>
             <a:endParaRPr lang="en-US"/>
           </a:p>
@@ -630,7 +630,7 @@
           <a:p>
             <a:fld id="{5D1B769D-4479-6C4A-BB04-AB0258055D9C}" type="datetimeFigureOut">
               <a:rPr lang="en-US" smtClean="0"/>
-              <a:t>3/26/19</a:t>
+              <a:t>4/3/19</a:t>
             </a:fld>
             <a:endParaRPr lang="en-US"/>
           </a:p>
@@ -795,7 +795,7 @@
           <a:p>
             <a:fld id="{5D1B769D-4479-6C4A-BB04-AB0258055D9C}" type="datetimeFigureOut">
               <a:rPr lang="en-US" smtClean="0"/>
-              <a:t>3/26/19</a:t>
+              <a:t>4/3/19</a:t>
             </a:fld>
             <a:endParaRPr lang="en-US"/>
           </a:p>
@@ -970,7 +970,7 @@
           <a:p>
             <a:fld id="{5D1B769D-4479-6C4A-BB04-AB0258055D9C}" type="datetimeFigureOut">
               <a:rPr lang="en-US" smtClean="0"/>
-              <a:t>3/26/19</a:t>
+              <a:t>4/3/19</a:t>
             </a:fld>
             <a:endParaRPr lang="en-US"/>
           </a:p>
@@ -1135,7 +1135,7 @@
           <a:p>
             <a:fld id="{5D1B769D-4479-6C4A-BB04-AB0258055D9C}" type="datetimeFigureOut">
               <a:rPr lang="en-US" smtClean="0"/>
-              <a:t>3/26/19</a:t>
+              <a:t>4/3/19</a:t>
             </a:fld>
             <a:endParaRPr lang="en-US"/>
           </a:p>
@@ -1374,7 +1374,7 @@
           <a:p>
             <a:fld id="{5D1B769D-4479-6C4A-BB04-AB0258055D9C}" type="datetimeFigureOut">
               <a:rPr lang="en-US" smtClean="0"/>
-              <a:t>3/26/19</a:t>
+              <a:t>4/3/19</a:t>
             </a:fld>
             <a:endParaRPr lang="en-US"/>
           </a:p>
@@ -1601,7 +1601,7 @@
           <a:p>
             <a:fld id="{5D1B769D-4479-6C4A-BB04-AB0258055D9C}" type="datetimeFigureOut">
               <a:rPr lang="en-US" smtClean="0"/>
-              <a:t>3/26/19</a:t>
+              <a:t>4/3/19</a:t>
             </a:fld>
             <a:endParaRPr lang="en-US"/>
           </a:p>
@@ -1963,7 +1963,7 @@
           <a:p>
             <a:fld id="{5D1B769D-4479-6C4A-BB04-AB0258055D9C}" type="datetimeFigureOut">
               <a:rPr lang="en-US" smtClean="0"/>
-              <a:t>3/26/19</a:t>
+              <a:t>4/3/19</a:t>
             </a:fld>
             <a:endParaRPr lang="en-US"/>
           </a:p>
@@ -2076,7 +2076,7 @@
           <a:p>
             <a:fld id="{5D1B769D-4479-6C4A-BB04-AB0258055D9C}" type="datetimeFigureOut">
               <a:rPr lang="en-US" smtClean="0"/>
-              <a:t>3/26/19</a:t>
+              <a:t>4/3/19</a:t>
             </a:fld>
             <a:endParaRPr lang="en-US"/>
           </a:p>
@@ -2166,7 +2166,7 @@
           <a:p>
             <a:fld id="{5D1B769D-4479-6C4A-BB04-AB0258055D9C}" type="datetimeFigureOut">
               <a:rPr lang="en-US" smtClean="0"/>
-              <a:t>3/26/19</a:t>
+              <a:t>4/3/19</a:t>
             </a:fld>
             <a:endParaRPr lang="en-US"/>
           </a:p>
@@ -2438,7 +2438,7 @@
           <a:p>
             <a:fld id="{5D1B769D-4479-6C4A-BB04-AB0258055D9C}" type="datetimeFigureOut">
               <a:rPr lang="en-US" smtClean="0"/>
-              <a:t>3/26/19</a:t>
+              <a:t>4/3/19</a:t>
             </a:fld>
             <a:endParaRPr lang="en-US"/>
           </a:p>
@@ -2690,7 +2690,7 @@
           <a:p>
             <a:fld id="{5D1B769D-4479-6C4A-BB04-AB0258055D9C}" type="datetimeFigureOut">
               <a:rPr lang="en-US" smtClean="0"/>
-              <a:t>3/26/19</a:t>
+              <a:t>4/3/19</a:t>
             </a:fld>
             <a:endParaRPr lang="en-US"/>
           </a:p>
@@ -2898,7 +2898,7 @@
           <a:p>
             <a:fld id="{5D1B769D-4479-6C4A-BB04-AB0258055D9C}" type="datetimeFigureOut">
               <a:rPr lang="en-US" smtClean="0"/>
-              <a:t>3/26/19</a:t>
+              <a:t>4/3/19</a:t>
             </a:fld>
             <a:endParaRPr lang="en-US"/>
           </a:p>
@@ -12032,7 +12032,7 @@
           <p:cNvPr id="2" name="Title 1">
             <a:extLst>
               <a:ext uri="{FF2B5EF4-FFF2-40B4-BE49-F238E27FC236}">
-                <a16:creationId xmlns:a16="http://schemas.microsoft.com/office/drawing/2014/main" xmlns="" id="{F7AC3872-664A-CC4C-BDC5-D61C47E371A8}"/>
+                <a16:creationId xmlns="" xmlns:a16="http://schemas.microsoft.com/office/drawing/2014/main" id="{F7AC3872-664A-CC4C-BDC5-D61C47E371A8}"/>
               </a:ext>
             </a:extLst>
           </p:cNvPr>
@@ -12060,7 +12060,7 @@
           <p:cNvPr id="4" name="Rectangle 3">
             <a:extLst>
               <a:ext uri="{FF2B5EF4-FFF2-40B4-BE49-F238E27FC236}">
-                <a16:creationId xmlns:a16="http://schemas.microsoft.com/office/drawing/2014/main" xmlns="" id="{25A414E1-7B5A-954D-870E-9256C72726D7}"/>
+                <a16:creationId xmlns="" xmlns:a16="http://schemas.microsoft.com/office/drawing/2014/main" id="{25A414E1-7B5A-954D-870E-9256C72726D7}"/>
               </a:ext>
             </a:extLst>
           </p:cNvPr>
@@ -12109,7 +12109,7 @@
           <p:cNvPr id="5" name="Rectangle 4">
             <a:extLst>
               <a:ext uri="{FF2B5EF4-FFF2-40B4-BE49-F238E27FC236}">
-                <a16:creationId xmlns:a16="http://schemas.microsoft.com/office/drawing/2014/main" xmlns="" id="{F020A002-4477-F840-B48B-78C3A1552DA0}"/>
+                <a16:creationId xmlns="" xmlns:a16="http://schemas.microsoft.com/office/drawing/2014/main" id="{F020A002-4477-F840-B48B-78C3A1552DA0}"/>
               </a:ext>
             </a:extLst>
           </p:cNvPr>
@@ -12158,7 +12158,7 @@
           <p:cNvPr id="6" name="TextBox 5">
             <a:extLst>
               <a:ext uri="{FF2B5EF4-FFF2-40B4-BE49-F238E27FC236}">
-                <a16:creationId xmlns:a16="http://schemas.microsoft.com/office/drawing/2014/main" xmlns="" id="{F7902DFD-780E-7D48-9304-ECD24AFA11AB}"/>
+                <a16:creationId xmlns="" xmlns:a16="http://schemas.microsoft.com/office/drawing/2014/main" id="{F7902DFD-780E-7D48-9304-ECD24AFA11AB}"/>
               </a:ext>
             </a:extLst>
           </p:cNvPr>
@@ -12190,7 +12190,7 @@
           <p:cNvPr id="7" name="Rectangle 6">
             <a:extLst>
               <a:ext uri="{FF2B5EF4-FFF2-40B4-BE49-F238E27FC236}">
-                <a16:creationId xmlns:a16="http://schemas.microsoft.com/office/drawing/2014/main" xmlns="" id="{94CB2F40-E770-734E-AC93-EDBFC660CFC7}"/>
+                <a16:creationId xmlns="" xmlns:a16="http://schemas.microsoft.com/office/drawing/2014/main" id="{94CB2F40-E770-734E-AC93-EDBFC660CFC7}"/>
               </a:ext>
             </a:extLst>
           </p:cNvPr>
@@ -12239,7 +12239,7 @@
           <p:cNvPr id="9" name="Rectangle 8">
             <a:extLst>
               <a:ext uri="{FF2B5EF4-FFF2-40B4-BE49-F238E27FC236}">
-                <a16:creationId xmlns:a16="http://schemas.microsoft.com/office/drawing/2014/main" xmlns="" id="{813B3CA8-929C-F24A-8167-085E5F94FEB8}"/>
+                <a16:creationId xmlns="" xmlns:a16="http://schemas.microsoft.com/office/drawing/2014/main" id="{813B3CA8-929C-F24A-8167-085E5F94FEB8}"/>
               </a:ext>
             </a:extLst>
           </p:cNvPr>
@@ -12289,7 +12289,7 @@
           <p:cNvPr id="15" name="Rectangle 14">
             <a:extLst>
               <a:ext uri="{FF2B5EF4-FFF2-40B4-BE49-F238E27FC236}">
-                <a16:creationId xmlns:a16="http://schemas.microsoft.com/office/drawing/2014/main" xmlns="" id="{01013A0E-A90D-6842-B724-9E245A0BF9C9}"/>
+                <a16:creationId xmlns="" xmlns:a16="http://schemas.microsoft.com/office/drawing/2014/main" id="{01013A0E-A90D-6842-B724-9E245A0BF9C9}"/>
               </a:ext>
             </a:extLst>
           </p:cNvPr>
@@ -12346,7 +12346,7 @@
           <p:cNvPr id="16" name="Rectangle 15">
             <a:extLst>
               <a:ext uri="{FF2B5EF4-FFF2-40B4-BE49-F238E27FC236}">
-                <a16:creationId xmlns:a16="http://schemas.microsoft.com/office/drawing/2014/main" xmlns="" id="{F2BE2857-95D3-8940-BD4F-8786E6D26DD0}"/>
+                <a16:creationId xmlns="" xmlns:a16="http://schemas.microsoft.com/office/drawing/2014/main" id="{F2BE2857-95D3-8940-BD4F-8786E6D26DD0}"/>
               </a:ext>
             </a:extLst>
           </p:cNvPr>
@@ -12403,7 +12403,7 @@
           <p:cNvPr id="17" name="Rectangle 16">
             <a:extLst>
               <a:ext uri="{FF2B5EF4-FFF2-40B4-BE49-F238E27FC236}">
-                <a16:creationId xmlns:a16="http://schemas.microsoft.com/office/drawing/2014/main" xmlns="" id="{55DBE446-2F63-0148-A211-436F566151E7}"/>
+                <a16:creationId xmlns="" xmlns:a16="http://schemas.microsoft.com/office/drawing/2014/main" id="{55DBE446-2F63-0148-A211-436F566151E7}"/>
               </a:ext>
             </a:extLst>
           </p:cNvPr>
@@ -12460,7 +12460,7 @@
           <p:cNvPr id="18" name="Rectangle 17">
             <a:extLst>
               <a:ext uri="{FF2B5EF4-FFF2-40B4-BE49-F238E27FC236}">
-                <a16:creationId xmlns:a16="http://schemas.microsoft.com/office/drawing/2014/main" xmlns="" id="{A1CEFAE2-5FFA-B94F-8693-ED46EDD63F38}"/>
+                <a16:creationId xmlns="" xmlns:a16="http://schemas.microsoft.com/office/drawing/2014/main" id="{A1CEFAE2-5FFA-B94F-8693-ED46EDD63F38}"/>
               </a:ext>
             </a:extLst>
           </p:cNvPr>
@@ -12517,7 +12517,7 @@
           <p:cNvPr id="20" name="TextBox 19">
             <a:extLst>
               <a:ext uri="{FF2B5EF4-FFF2-40B4-BE49-F238E27FC236}">
-                <a16:creationId xmlns:a16="http://schemas.microsoft.com/office/drawing/2014/main" xmlns="" id="{96B30896-74FD-C24C-B7BB-BDD3ED76798A}"/>
+                <a16:creationId xmlns="" xmlns:a16="http://schemas.microsoft.com/office/drawing/2014/main" id="{96B30896-74FD-C24C-B7BB-BDD3ED76798A}"/>
               </a:ext>
             </a:extLst>
           </p:cNvPr>
@@ -12552,7 +12552,7 @@
           <p:cNvPr id="21" name="TextBox 20">
             <a:extLst>
               <a:ext uri="{FF2B5EF4-FFF2-40B4-BE49-F238E27FC236}">
-                <a16:creationId xmlns:a16="http://schemas.microsoft.com/office/drawing/2014/main" xmlns="" id="{76D67C6A-710A-0A4C-9B52-E4F5E98E9191}"/>
+                <a16:creationId xmlns="" xmlns:a16="http://schemas.microsoft.com/office/drawing/2014/main" id="{76D67C6A-710A-0A4C-9B52-E4F5E98E9191}"/>
               </a:ext>
             </a:extLst>
           </p:cNvPr>
@@ -12587,7 +12587,7 @@
           <p:cNvPr id="23" name="Straight Arrow Connector 22">
             <a:extLst>
               <a:ext uri="{FF2B5EF4-FFF2-40B4-BE49-F238E27FC236}">
-                <a16:creationId xmlns:a16="http://schemas.microsoft.com/office/drawing/2014/main" xmlns="" id="{1F6F2B3D-250C-084C-90ED-0F82EC25DFDC}"/>
+                <a16:creationId xmlns="" xmlns:a16="http://schemas.microsoft.com/office/drawing/2014/main" id="{1F6F2B3D-250C-084C-90ED-0F82EC25DFDC}"/>
               </a:ext>
             </a:extLst>
           </p:cNvPr>
@@ -12633,7 +12633,7 @@
           <p:cNvPr id="25" name="Straight Arrow Connector 24">
             <a:extLst>
               <a:ext uri="{FF2B5EF4-FFF2-40B4-BE49-F238E27FC236}">
-                <a16:creationId xmlns:a16="http://schemas.microsoft.com/office/drawing/2014/main" xmlns="" id="{F3109D8F-F041-2742-9A45-B1F14C1A499C}"/>
+                <a16:creationId xmlns="" xmlns:a16="http://schemas.microsoft.com/office/drawing/2014/main" id="{F3109D8F-F041-2742-9A45-B1F14C1A499C}"/>
               </a:ext>
             </a:extLst>
           </p:cNvPr>
@@ -12677,7 +12677,7 @@
           <p:cNvPr id="26" name="Straight Arrow Connector 25">
             <a:extLst>
               <a:ext uri="{FF2B5EF4-FFF2-40B4-BE49-F238E27FC236}">
-                <a16:creationId xmlns:a16="http://schemas.microsoft.com/office/drawing/2014/main" xmlns="" id="{9AB1BE36-FEA9-AB4A-92EC-79E2B1ED2B5F}"/>
+                <a16:creationId xmlns="" xmlns:a16="http://schemas.microsoft.com/office/drawing/2014/main" id="{9AB1BE36-FEA9-AB4A-92EC-79E2B1ED2B5F}"/>
               </a:ext>
             </a:extLst>
           </p:cNvPr>
@@ -12721,7 +12721,7 @@
           <p:cNvPr id="27" name="Straight Arrow Connector 26">
             <a:extLst>
               <a:ext uri="{FF2B5EF4-FFF2-40B4-BE49-F238E27FC236}">
-                <a16:creationId xmlns:a16="http://schemas.microsoft.com/office/drawing/2014/main" xmlns="" id="{31BB1E19-F486-9F4E-A400-8D46E3496B3C}"/>
+                <a16:creationId xmlns="" xmlns:a16="http://schemas.microsoft.com/office/drawing/2014/main" id="{31BB1E19-F486-9F4E-A400-8D46E3496B3C}"/>
               </a:ext>
             </a:extLst>
           </p:cNvPr>
@@ -12765,7 +12765,7 @@
           <p:cNvPr id="33" name="Right Brace 32">
             <a:extLst>
               <a:ext uri="{FF2B5EF4-FFF2-40B4-BE49-F238E27FC236}">
-                <a16:creationId xmlns:a16="http://schemas.microsoft.com/office/drawing/2014/main" xmlns="" id="{5A17CF90-A157-254C-852B-E692D446776E}"/>
+                <a16:creationId xmlns="" xmlns:a16="http://schemas.microsoft.com/office/drawing/2014/main" id="{5A17CF90-A157-254C-852B-E692D446776E}"/>
               </a:ext>
             </a:extLst>
           </p:cNvPr>
@@ -12814,7 +12814,7 @@
           <p:cNvPr id="34" name="TextBox 33">
             <a:extLst>
               <a:ext uri="{FF2B5EF4-FFF2-40B4-BE49-F238E27FC236}">
-                <a16:creationId xmlns:a16="http://schemas.microsoft.com/office/drawing/2014/main" xmlns="" id="{E4CD285D-531C-784A-A22E-F4B496901D17}"/>
+                <a16:creationId xmlns="" xmlns:a16="http://schemas.microsoft.com/office/drawing/2014/main" id="{E4CD285D-531C-784A-A22E-F4B496901D17}"/>
               </a:ext>
             </a:extLst>
           </p:cNvPr>
@@ -23925,7 +23925,8 @@
           </a:prstGeom>
           <a:solidFill>
             <a:schemeClr val="accent6">
-              <a:lumMod val="75000"/>
+              <a:lumMod val="60000"/>
+              <a:lumOff val="40000"/>
             </a:schemeClr>
           </a:solidFill>
           <a:ln w="19050">

</xml_diff>